<commit_message>
feat: day1/01-introduction 슬라이드에 발표자 메모 추가
- V1, V2 모든 슬라이드(41개)에 발표자 스크립트 추가
- 각 슬라이드별 발표 가이드 작성
- slides.md 내용 기반 스크립트 구성

Co-Authored-By: Claude Opus 4.5 <noreply@anthropic.com>
</commit_message>
<xml_diff>
--- a/day1/01-introduction/AI-활용-필요성-v1.pptx
+++ b/day1/01-introduction/AI-활용-필요성-v1.pptx
@@ -542,7 +542,9 @@
           <a:p>
             <a:r>
               <a:rPr lang="en-US" dirty="0"/>
-              <a:t/>
+              <a:t>안녕하세요, AI 활용 필요성에 대한 세션을 시작하겠습니다.
+앤드류 응 교수님의 말씀처럼 "여러분이 안 만들면 아무도 안 만듭니다."
+오늘은 왜 지금 AI를 활용해야 하는지, 그리고 어떻게 활용해야 하는지 알아보겠습니다.</a:t>
             </a:r>
             <a:endParaRPr lang="en-US" dirty="0"/>
           </a:p>
@@ -630,7 +632,12 @@
           <a:p>
             <a:r>
               <a:rPr lang="en-US" dirty="0"/>
-              <a:t/>
+              <a:t>새로운 병목은 "무엇을 만들 것인가"입니다.
+AI에게 의도를 명확하게 번역해서 전달하는 것이 중요해졌습니다.
+프롬프트를 잘 작성하는 것, 요구사항을 명확하게 정의하는 것이 핵심 역량이 됩니다.
+개발 루프도 바뀌었습니다.
+코드 작성 → 사용자 피드백 → 수정의 빠른 반복이 가능해졌습니다.
+한 달 걸리던 개발 사이클이 하루로 줄어들 수 있습니다.</a:t>
             </a:r>
             <a:endParaRPr lang="en-US" dirty="0"/>
           </a:p>
@@ -718,7 +725,8 @@
           <a:p>
             <a:r>
               <a:rPr lang="en-US" dirty="0"/>
-              <a:t/>
+              <a:t>네 번째 주제는 인력 구조의 파괴입니다.
+AI의 등장으로 기존의 PM과 엔지니어 비율이 완전히 바뀌고 있습니다.</a:t>
             </a:r>
             <a:endParaRPr lang="en-US" dirty="0"/>
           </a:p>
@@ -806,7 +814,12 @@
           <a:p>
             <a:r>
               <a:rPr lang="en-US" dirty="0"/>
-              <a:t/>
+              <a:t>전통적으로 PM 1명당 엔지니어 8명이 붙었습니다.
+기획서 하나를 주면 엔지니어들이 며칠간 작업했습니다.
+지금은 PM 1명당 엔지니어 2명, 심지어 1:1 비율로 변화하고 있습니다.
+구글, 메타 같은 빅테크의 황금 비율이 무너지고 있습니다.
+이것은 엔지니어가 덜 필요해진다는 의미가 아닙니다.
+엔지니어의 역할이 바뀐다는 의미입니다.</a:t>
             </a:r>
             <a:endParaRPr lang="en-US" dirty="0"/>
           </a:p>
@@ -894,7 +907,11 @@
           <a:p>
             <a:r>
               <a:rPr lang="en-US" dirty="0"/>
-              <a:t/>
+              <a:t>개발자의 시간 분배도 크게 변화했습니다.
+전통적으로는 코드 작성 30%, 디버깅 25%, 문서와 회의 45%였습니다.
+AI를 활용하면 설계와 검토 40%, AI 협업 35%, 문서와 회의 25%로 바뀝니다.
+핵심 변화는 코드 "작성"에서 코드 "검토"로 역할이 전환된다는 것입니다.
+AI가 코드를 작성하고, 개발자는 그것을 검토하고 개선합니다.</a:t>
             </a:r>
             <a:endParaRPr lang="en-US" dirty="0"/>
           </a:p>
@@ -982,7 +999,8 @@
           <a:p>
             <a:r>
               <a:rPr lang="en-US" dirty="0"/>
-              <a:t/>
+              <a:t>다섯 번째 주제는 AI 시대의 인재상입니다.
+단순한 코더가 아닌 프로덕트 엔지니어가 필요해졌습니다.</a:t>
             </a:r>
             <a:endParaRPr lang="en-US" dirty="0"/>
           </a:p>
@@ -1070,7 +1088,11 @@
           <a:p>
             <a:r>
               <a:rPr lang="en-US" dirty="0"/>
-              <a:t/>
+              <a:t>살아남는 엔지니어는 단순히 코딩만 잘하는 사람이 아닙니다.
+AI 시대에는 코딩 자체는 AI가 더 잘하게 됩니다.
+그래서 필요한 것은 사용자와 대화하고 피드백을 흡수하는 능력,
+그리고 무엇을 만들지 스스로 결정하는 능력입니다.
+기획서를 받아서 구현만 하는 역할은 점점 줄어들 것입니다.</a:t>
             </a:r>
             <a:endParaRPr lang="en-US" dirty="0"/>
           </a:p>
@@ -1158,7 +1180,11 @@
           <a:p>
             <a:r>
               <a:rPr lang="en-US" dirty="0"/>
-              <a:t/>
+              <a:t>프로덕트 엔지니어는 구현 능력과 기획 능력을 모두 갖춘 사람입니다.
+엔지니어로서의 구현 능력에 PM으로서의 기획 능력을 더한 것입니다.
+이런 사람이 AI 시대에 가장 가치있는 인재가 됩니다.
+중요한 조언: 누군가 기획서를 주길 기다리지 마세요.
+자신의 직관을 믿고 결과물을 만들어 나가는 사람이 압도적인 속도로 앞서 나갑니다.</a:t>
             </a:r>
             <a:endParaRPr lang="en-US" dirty="0"/>
           </a:p>
@@ -1246,7 +1272,8 @@
           <a:p>
             <a:r>
               <a:rPr lang="en-US" dirty="0"/>
-              <a:t/>
+              <a:t>여섯 번째 주제는 AI 도구의 생산성 향상입니다.
+실제 연구 결과를 통해 AI 도구가 얼마나 효과적인지 살펴보겠습니다.</a:t>
             </a:r>
             <a:endParaRPr lang="en-US" dirty="0"/>
           </a:p>
@@ -1334,7 +1361,12 @@
           <a:p>
             <a:r>
               <a:rPr lang="en-US" dirty="0"/>
-              <a:t/>
+              <a:t>2023년 GitHub Copilot 연구 결과를 보면:
+작업 완료 속도가 55% 더 빨라졌습니다.
+코드 품질은 동일하거나 오히려 더 나아졌습니다.
+88%의 개발자가 생산성 향상을 체감했습니다.
+이미 AI 코딩 도구의 효과가 검증되었습니다.
+사용하지 않는 것은 선택이 아니라 뒤처지는 것입니다.</a:t>
             </a:r>
             <a:endParaRPr lang="en-US" dirty="0"/>
           </a:p>
@@ -1422,7 +1454,12 @@
           <a:p>
             <a:r>
               <a:rPr lang="en-US" dirty="0"/>
-              <a:t/>
+              <a:t>실제 사용 사례를 비교해보면:
+보일러플레이트 코드: 과거에는 수동 작성, 이제는 자동 생성
+테스트 코드: 시간 부족으로 생략하던 것을 이제는 빠르게 생성
+문서화: "나중에 하자"가 결국 안 했던 것이, 이제는 코드와 함께 생성
+버그 디버깅: 로그 추적 대신 AI가 원인 분석
+특히 테스트와 문서화처럼 중요하지만 미루기 쉬운 작업을 AI가 도와줍니다.</a:t>
             </a:r>
             <a:endParaRPr lang="en-US" dirty="0"/>
           </a:p>
@@ -1510,7 +1547,8 @@
           <a:p>
             <a:r>
               <a:rPr lang="en-US" dirty="0"/>
-              <a:t/>
+              <a:t>첫 번째 주제는 AI 발전 속도에 대한 우리의 오해입니다.
+많은 분들이 "AI 발전이 둔화되었다"고 생각하시는데, 과연 그럴까요?</a:t>
             </a:r>
             <a:endParaRPr lang="en-US" dirty="0"/>
           </a:p>
@@ -1598,7 +1636,8 @@
           <a:p>
             <a:r>
               <a:rPr lang="en-US" dirty="0"/>
-              <a:t/>
+              <a:t>일곱 번째 주제는 AI 도구의 종류입니다.
+AI IDE, Vibe 코딩 툴, 채팅 기반 코딩 등 다양한 카테고리가 있습니다.</a:t>
             </a:r>
             <a:endParaRPr lang="en-US" dirty="0"/>
           </a:p>
@@ -1686,7 +1725,10 @@
           <a:p>
             <a:r>
               <a:rPr lang="en-US" dirty="0"/>
-              <a:t/>
+              <a:t>AI IDE는 통합 개발 환경 자체에 AI가 내장된 도구입니다.
+AWS Kiro는 스펙 기반 개발과 에이전트를 지원합니다.
+Google Antigravity는 자연어로 풀스택 앱을 생성합니다.
+이런 도구들은 코드 작성을 넘어 전체 개발 프로세스를 AI가 지원합니다.</a:t>
             </a:r>
             <a:endParaRPr lang="en-US" dirty="0"/>
           </a:p>
@@ -1774,7 +1816,13 @@
           <a:p>
             <a:r>
               <a:rPr lang="en-US" dirty="0"/>
-              <a:t/>
+              <a:t>Vibe 코딩 툴은 자연어로 앱을 만드는 도구입니다.
+Replit Agent는 브라우저에서 즉시 실행하고 배포할 수 있습니다.
+Lovable은 노코드/로우코드로 풀스택 앱을 빌드합니다.
+코드 자동 완성 도구도 다양합니다.
+GitHub Copilot은 VS Code, JetBrains에 통합됩니다.
+Cursor는 AI 네이티브 에디터로 설계되었습니다.
+Codeium은 무료 대안으로 사용할 수 있습니다.</a:t>
             </a:r>
             <a:endParaRPr lang="en-US" dirty="0"/>
           </a:p>
@@ -1862,7 +1910,12 @@
           <a:p>
             <a:r>
               <a:rPr lang="en-US" dirty="0"/>
-              <a:t/>
+              <a:t>AI 채팅 기반 코딩 도구도 강력합니다.
+Claude Code는 터미널 기반의 AI 코딩 에이전트입니다.
+파일 시스템에 직접 접근하여 코드를 작성하고 수정할 수 있습니다.
+ChatGPT는 범용 AI 어시스턴트로 코딩에도 활용됩니다.
+Gemini는 Google의 AI 어시스턴트입니다.
+오늘 실습에서는 이런 도구들을 직접 사용해볼 예정입니다.</a:t>
             </a:r>
             <a:endParaRPr lang="en-US" dirty="0"/>
           </a:p>
@@ -1950,7 +2003,8 @@
           <a:p>
             <a:r>
               <a:rPr lang="en-US" dirty="0"/>
-              <a:t/>
+              <a:t>여덟 번째 주제는 AI의 한계와 주의점입니다.
+AI를 잘 활용하려면 AI가 잘하는 것과 못하는 것을 알아야 합니다.</a:t>
             </a:r>
             <a:endParaRPr lang="en-US" dirty="0"/>
           </a:p>
@@ -2038,7 +2092,13 @@
           <a:p>
             <a:r>
               <a:rPr lang="en-US" dirty="0"/>
-              <a:t/>
+              <a:t>AI가 잘하는 것:
+반복적인 코드 패턴 생성, 문서화 및 주석 작성, 간단한 버그 수정, 코드 설명 및 리팩토링 제안
+AI가 아직 못하는 것:
+복잡한 시스템 설계 - 전체 아키텍처는 인간의 판단이 필요합니다
+비즈니스 로직 이해 - 도메인 지식은 여전히 인간의 영역입니다
+보안 취약점 완벽 탐지 - 보안 검토는 반드시 사람이 해야 합니다
+최신 라이브러리 - 학습 데이터의 한계가 있습니다</a:t>
             </a:r>
             <a:endParaRPr lang="en-US" dirty="0"/>
           </a:p>
@@ -2126,7 +2186,11 @@
           <a:p>
             <a:r>
               <a:rPr lang="en-US" dirty="0"/>
-              <a:t/>
+              <a:t>AI 사용 시 반드시 기억해야 할 주의사항입니다.
+첫째, AI가 생성한 코드를 맹신하지 마세요. AI도 틀릴 수 있습니다.
+둘째, 민감한 정보를 AI에 전송하지 마세요. API 키, 비밀번호 등은 절대 공유하면 안 됩니다.
+셋째, 저작권과 라이선스 이슈를 고려하세요. AI가 생성한 코드의 출처가 불분명할 수 있습니다.
+넷째, AI 결과물은 반드시 검토하세요. 리뷰 없이 프로덕션에 배포하면 안 됩니다.</a:t>
             </a:r>
             <a:endParaRPr lang="en-US" dirty="0"/>
           </a:p>
@@ -2214,7 +2278,8 @@
           <a:p>
             <a:r>
               <a:rPr lang="en-US" dirty="0"/>
-              <a:t/>
+              <a:t>아홉 번째 주제는 효과적인 AI 활용 전략입니다.
+AI를 잘 쓰려면 프롬프트를 잘 작성해야 합니다.</a:t>
             </a:r>
             <a:endParaRPr lang="en-US" dirty="0"/>
           </a:p>
@@ -2302,7 +2367,10 @@
           <a:p>
             <a:r>
               <a:rPr lang="en-US" dirty="0"/>
-              <a:t/>
+              <a:t>효과적인 AI 활용 3단계입니다.
+1단계: 문제 정의 - "이거 고쳐줘" 대신 구체적으로 요청하세요.
+2단계: 맥락 제공 - "로그인 만들어줘" 대신 기술 스택과 조건을 명시하세요.
+3단계: 점진적 개선 - 한 번에 완벽한 결과를 기대하지 말고, 기본 구현 → 엣지 케이스 → 테스트 → 리팩토링 순으로 개선하세요.</a:t>
             </a:r>
             <a:endParaRPr lang="en-US" dirty="0"/>
           </a:p>
@@ -2390,7 +2458,13 @@
           <a:p>
             <a:r>
               <a:rPr lang="en-US" dirty="0"/>
-              <a:t/>
+              <a:t>좋은 프롬프트와 나쁜 프롬프트를 비교해보면:
+나쁜 예시: "이거 고쳐줘", "로그인 만들어줘"
+AI가 무엇을 해야 하는지 모호합니다.
+좋은 예시:
+"Python에서 리스트 중복 제거하면서 순서 유지하는 함수 작성해줘"
+"FastAPI로 JWT 인증 기반 로그인 API 만들어줘. 사용자 정보는 PostgreSQL에 저장되어 있고..."
+구체적이고 맥락이 있으면 AI가 더 정확한 결과를 제공합니다.</a:t>
             </a:r>
             <a:endParaRPr lang="en-US" dirty="0"/>
           </a:p>
@@ -2478,7 +2552,11 @@
           <a:p>
             <a:r>
               <a:rPr lang="en-US" dirty="0"/>
-              <a:t/>
+              <a:t>GPT-4에서 GPT-5로, Gemini 1에서 2로 업데이트되어도 체감이 줄어든다고 느끼시는 분들이 많습니다.
+하지만 이것은 AI 발전이 멈춘 게 아닙니다.
+실제 원인은 벤치마크의 포화 상태입니다.
+시험 문제가 100점 만점인데 AI가 이미 100점을 받고 있으면, 실제로 120점, 200점의 실력이 되어도 그래프는 평평하게 보입니다.
+측정 도구의 한계이지, 발전의 한계가 아닙니다.</a:t>
             </a:r>
             <a:endParaRPr lang="en-US" dirty="0"/>
           </a:p>
@@ -2566,7 +2644,8 @@
           <a:p>
             <a:r>
               <a:rPr lang="en-US" dirty="0"/>
-              <a:t/>
+              <a:t>열 번째 주제는 커리어 전략입니다.
+앤드류 응 교수님의 조언을 바탕으로 AI 시대의 커리어 전략을 살펴보겠습니다.</a:t>
             </a:r>
             <a:endParaRPr lang="en-US" dirty="0"/>
           </a:p>
@@ -2654,7 +2733,11 @@
           <a:p>
             <a:r>
               <a:rPr lang="en-US" dirty="0"/>
-              <a:t/>
+              <a:t>앤드류 응 교수님의 중요한 조언입니다.
+"성공의 가장 큰 예측 변수는 지능이나 노력이 아니라, 지금 곁에 어떤 사람을 두고 있는가"
+논문이 공개되기 전에 전화 한 통으로 조언을 들을 수 있는 동료가 있나요?
+인터넷에 없는 원시 데이터와 진짜 정보는 인적 네트워크를 통해서만 공유됩니다.
+좋은 환경과 좋은 동료를 찾는 것이 커리어 성장의 핵심입니다.</a:t>
             </a:r>
             <a:endParaRPr lang="en-US" dirty="0"/>
           </a:p>
@@ -2742,7 +2825,12 @@
           <a:p>
             <a:r>
               <a:rPr lang="en-US" dirty="0"/>
-              <a:t/>
+              <a:t>채용 시 피해야 할 회사에 대한 조언입니다.
+브랜드의 함정: 유명 빅테크 기업의 이름표가 실력을 키워주지 않습니다.
+구글, 메타, 아마존 다녔다고 해서 자동으로 성장하는 것이 아닙니다.
+통합 채용의 위험: "입사 후 팀을 정해준다"며 정확히 어떤 팀, 어떤 매니저와 일할지 숨기는 회사는 피하세요.
+결론: 브랜드가 아닌 '진짜 배기 팀'을 찾아야 합니다.
+어떤 사람들과 함께 일할지가 가장 중요합니다.</a:t>
             </a:r>
             <a:endParaRPr lang="en-US" dirty="0"/>
           </a:p>
@@ -2830,7 +2918,8 @@
           <a:p>
             <a:r>
               <a:rPr lang="en-US" dirty="0"/>
-              <a:t/>
+              <a:t>마지막 주제는 태도와 행동에 대한 조언입니다.
+AI 시대를 살아가는 데 필요한 마인드셋입니다.</a:t>
             </a:r>
             <a:endParaRPr lang="en-US" dirty="0"/>
           </a:p>
@@ -2918,7 +3007,13 @@
           <a:p>
             <a:r>
               <a:rPr lang="en-US" dirty="0"/>
-              <a:t/>
+              <a:t>허락받지 않는 혁신, Permissionless Innovation입니다.
+지금은 실패 비용이 역사상 가장 저렴한 시대입니다.
+실패해도 주말 이틀 날리는 것뿐입니다.
+AI 덕분에 프로토타입 만드는 데 며칠이 아니라 몇 시간이면 됩니다.
+팀장, 교수, 투자자의 승인을 기다리지 마세요.
+그냥 만드세요. Just Build.
+허락을 구하기보다 용서를 구하는 것이 낫습니다.</a:t>
             </a:r>
             <a:endParaRPr lang="en-US" dirty="0"/>
           </a:p>
@@ -3006,7 +3101,13 @@
           <a:p>
             <a:r>
               <a:rPr lang="en-US" dirty="0"/>
-              <a:t/>
+              <a:t>마지막으로 지독한 노력, Hard Work입니다.
+성공한 사람 중 지독하게 일하지 않은 사람은 단 한 명도 없습니다.
+재능만으로는 충분하지 않습니다.
+소파에서 넷플릭스를 보는 대신, AI 에이전트를 설계하는 주말을 선택하세요.
+그 선택의 누적이 여러분의 미래를 결정합니다.
+앤드류 응 교수님의 말씀을 다시 한번 되새기겠습니다:
+"여러분이 안 만들면 아무도 안 만듭니다. 책임감을 갖고 멈추지 말고 시도하십시오."</a:t>
             </a:r>
             <a:endParaRPr lang="en-US" dirty="0"/>
           </a:p>
@@ -3094,7 +3195,7 @@
           <a:p>
             <a:r>
               <a:rPr lang="en-US" dirty="0"/>
-              <a:t/>
+              <a:t>이제 오늘 배울 내용을 미리보기로 살펴보겠습니다.</a:t>
             </a:r>
             <a:endParaRPr lang="en-US" dirty="0"/>
           </a:p>
@@ -3182,7 +3283,11 @@
           <a:p>
             <a:r>
               <a:rPr lang="en-US" dirty="0"/>
-              <a:t/>
+              <a:t>프롬프팅 기초에서는 두 가지 핵심 기법을 배웁니다.
+K-shot 프롬프팅: 예시를 보여주고 AI가 패턴을 학습하도록 유도합니다.
+Zero-shot, One-shot, Few-shot 등의 개념을 실습합니다.
+Chain of Thought: 단계별로 추론하도록 유도하는 기법입니다.
+복잡한 문제를 작은 단계로 나눠서 해결합니다.</a:t>
             </a:r>
             <a:endParaRPr lang="en-US" dirty="0"/>
           </a:p>
@@ -3270,7 +3375,10 @@
           <a:p>
             <a:r>
               <a:rPr lang="en-US" dirty="0"/>
-              <a:t/>
+              <a:t>프롬프팅 심화에서는 더 고급 기법을 배웁니다.
+RAG (Retrieval Augmented Generation): 외부 문서를 검색해서 AI에게 제공하고, 그것을 바탕으로 정확한 답변을 생성하는 기법입니다.
+Tool Calling: AI가 외부 도구나 API를 호출할 수 있게 하는 기법입니다.
+계산기, 검색 엔진, 데이터베이스 등을 AI가 직접 사용할 수 있습니다.</a:t>
             </a:r>
             <a:endParaRPr lang="en-US" dirty="0"/>
           </a:p>
@@ -3358,7 +3466,11 @@
           <a:p>
             <a:r>
               <a:rPr lang="en-US" dirty="0"/>
-              <a:t/>
+              <a:t>AI 코딩 도구 세션에서는 실제 도구들을 직접 사용해봅니다.
+AI IDE: AWS Kiro, Google Antigravity 등 AI가 내장된 개발 환경
+Vibe 코딩: Replit Agent, Lovable 등 자연어로 앱을 만드는 도구
+Claude Code: 터미널 기반 AI 에이전트, 스킬, MCP 등 고급 기능
+실습을 통해 직접 경험해보시기 바랍니다.</a:t>
             </a:r>
             <a:endParaRPr lang="en-US" dirty="0"/>
           </a:p>
@@ -3446,7 +3558,11 @@
           <a:p>
             <a:r>
               <a:rPr lang="en-US" dirty="0"/>
-              <a:t/>
+              <a:t>실제 AI의 성장 속도를 보면 정말 놀랍습니다.
+지능 지구력, 즉 AI가 유효하게 작업할 수 있는 시간은 7개월마다 2배로 증가하고 있습니다.
+이는 반도체 성능의 무어의 법칙(18-24개월에 2배)보다 3.5~5배 빠른 속도입니다.
+코딩 능력은 더 무섭습니다. 70일, 약 2달 반마다 2배로 성장합니다.
+인간이 수년에 걸쳐 쌓는 숙련도를 AI는 2달마다 갱신하고 있습니다.</a:t>
             </a:r>
             <a:endParaRPr lang="en-US" dirty="0"/>
           </a:p>
@@ -3534,7 +3650,11 @@
           <a:p>
             <a:r>
               <a:rPr lang="en-US" dirty="0"/>
-              <a:t/>
+              <a:t>토론 시간입니다.
+다음 질문들에 대해 생각해보시고 의견을 나눠봅시다:
+- AI 도구를 사용해 본 경험이 있나요? 어떤 도구를 사용하셨나요?
+- "프로덕트 엔지니어"라는 개념에 대해 어떻게 생각하나요? 기획과 개발을 모두 할 수 있어야 할까요?
+- 3개월마다 도구를 갈아타야 한다는 조언에 동의하나요? 익숙한 도구를 포기하는 것이 어렵지 않나요?</a:t>
             </a:r>
             <a:endParaRPr lang="en-US" dirty="0"/>
           </a:p>
@@ -3622,7 +3742,10 @@
           <a:p>
             <a:r>
               <a:rPr lang="en-US" dirty="0"/>
-              <a:t/>
+              <a:t>다음 세션에서는 프롬프팅 기초로 넘어갑니다.
+K-shot 프롬프팅과 Chain of Thought를 직접 실습해봅니다.
+Web UI를 사용해서 시스템 프롬프트를 적용하고 결과를 비교해볼 예정입니다.
+잠시 휴식 후 다음 세션으로 이어가겠습니다.</a:t>
             </a:r>
             <a:endParaRPr lang="en-US" dirty="0"/>
           </a:p>
@@ -3710,7 +3833,8 @@
           <a:p>
             <a:r>
               <a:rPr lang="en-US" dirty="0"/>
-              <a:t/>
+              <a:t>그렇다면 왜 "지금" AI를 활용해야 할까요?
+지금이야말로 역사상 유례없는 골드러시 시대입니다.</a:t>
             </a:r>
             <a:endParaRPr lang="en-US" dirty="0"/>
           </a:p>
@@ -3798,7 +3922,11 @@
           <a:p>
             <a:r>
               <a:rPr lang="en-US" dirty="0"/>
-              <a:t/>
+              <a:t>우리에게는 두 가지 강력한 무기가 생겼습니다.
+첫째, 더 강력해진 지능. LLM의 추론 능력이 비약적으로 향상되었습니다.
+둘째, 더 빨라진 속도. 실시간으로 코드를 생성하고 수정할 수 있습니다.
+이 두 가지를 LLM, RAG, 에이전틱 워크플로와 조합하면 레고 블록처럼 조립할 수 있습니다.
+과거에는 수백 명의 박사급 엔지니어가 필요했던 일을 이제는 혼자서 수행할 수 있습니다.</a:t>
             </a:r>
             <a:endParaRPr lang="en-US" dirty="0"/>
           </a:p>
@@ -3886,7 +4014,12 @@
           <a:p>
             <a:r>
               <a:rPr lang="en-US" dirty="0"/>
-              <a:t/>
+              <a:t>여기서 중요한 생존 경고를 드리겠습니다.
+"지금 최고의 도구가 무엇인가?"라는 질문의 답은 3개월마다 바뀝니다.
+단 3개월만 뒤처져도 생산성이 회복 불가능할 정도로 하락합니다.
+익숙하다는 이유로 녹슨 칼을 고집하지 마세요.
+무조건 최신 도구로 갈아타야 합니다.
+불편해도, 학습 곡선이 있어도 최신 도구를 사용해야 합니다.</a:t>
             </a:r>
             <a:endParaRPr lang="en-US" dirty="0"/>
           </a:p>
@@ -3974,7 +4107,8 @@
           <a:p>
             <a:r>
               <a:rPr lang="en-US" dirty="0"/>
-              <a:t/>
+              <a:t>세 번째 주제는 병목 지점의 이동입니다.
+소프트웨어 개발에서 어디가 어렵고 비싼지가 완전히 바뀌었습니다.</a:t>
             </a:r>
             <a:endParaRPr lang="en-US" dirty="0"/>
           </a:p>
@@ -4062,7 +4196,11 @@
           <a:p>
             <a:r>
               <a:rPr lang="en-US" dirty="0"/>
-              <a:t/>
+              <a:t>과거에는 기획은 쉬웠지만 구현이 어렵고 비쌌습니다.
+개발자를 고용하고, 시간을 들여 코드를 작성하는 것이 병목이었습니다.
+현재는 완전히 뒤집혔습니다.
+AI 덕분에 구현은 쉽고 저렴해졌습니다.
+이제 병목은 "무엇을 만들 것인가"를 결정하는 단계로 이동했습니다.</a:t>
             </a:r>
             <a:endParaRPr lang="en-US" dirty="0"/>
           </a:p>

</xml_diff>